<commit_message>
Adjusted ppt and added wireframe images
</commit_message>
<xml_diff>
--- a/Iteration-1/Iteration Presentation.pptx
+++ b/Iteration-1/Iteration Presentation.pptx
@@ -5961,6 +5961,36 @@
           </a:prstGeom>
         </p:spPr>
       </p:pic>
+      <p:pic>
+        <p:nvPicPr>
+          <p:cNvPr id="12" name="Picture 11">
+            <a:extLst>
+              <a:ext uri="{FF2B5EF4-FFF2-40B4-BE49-F238E27FC236}">
+                <a16:creationId xmlns:a16="http://schemas.microsoft.com/office/drawing/2014/main" id="{43732719-427D-CD47-A4C7-C2B52A490785}"/>
+              </a:ext>
+            </a:extLst>
+          </p:cNvPr>
+          <p:cNvPicPr>
+            <a:picLocks noChangeAspect="1"/>
+          </p:cNvPicPr>
+          <p:nvPr/>
+        </p:nvPicPr>
+        <p:blipFill>
+          <a:blip r:embed="rId3"/>
+          <a:stretch>
+            <a:fillRect/>
+          </a:stretch>
+        </p:blipFill>
+        <p:spPr>
+          <a:xfrm>
+            <a:off x="4915557" y="4633784"/>
+            <a:ext cx="3954162" cy="2224216"/>
+          </a:xfrm>
+          <a:prstGeom prst="rect">
+            <a:avLst/>
+          </a:prstGeom>
+        </p:spPr>
+      </p:pic>
     </p:spTree>
     <p:extLst>
       <p:ext uri="{BB962C8B-B14F-4D97-AF65-F5344CB8AC3E}">
@@ -5971,6 +6001,127 @@
   <p:clrMapOvr>
     <a:masterClrMapping/>
   </p:clrMapOvr>
+  <p:timing>
+    <p:tnLst>
+      <p:par>
+        <p:cTn id="1" dur="indefinite" restart="never" nodeType="tmRoot">
+          <p:childTnLst>
+            <p:seq concurrent="1" nextAc="seek">
+              <p:cTn id="2" dur="indefinite" nodeType="mainSeq">
+                <p:childTnLst>
+                  <p:par>
+                    <p:cTn id="3" fill="hold">
+                      <p:stCondLst>
+                        <p:cond delay="indefinite"/>
+                      </p:stCondLst>
+                      <p:childTnLst>
+                        <p:par>
+                          <p:cTn id="4" fill="hold">
+                            <p:stCondLst>
+                              <p:cond delay="0"/>
+                            </p:stCondLst>
+                            <p:childTnLst>
+                              <p:par>
+                                <p:cTn id="5" presetID="2" presetClass="entr" presetSubtype="2" fill="hold" nodeType="clickEffect">
+                                  <p:stCondLst>
+                                    <p:cond delay="0"/>
+                                  </p:stCondLst>
+                                  <p:childTnLst>
+                                    <p:set>
+                                      <p:cBhvr>
+                                        <p:cTn id="6" dur="1" fill="hold">
+                                          <p:stCondLst>
+                                            <p:cond delay="0"/>
+                                          </p:stCondLst>
+                                        </p:cTn>
+                                        <p:tgtEl>
+                                          <p:spTgt spid="12"/>
+                                        </p:tgtEl>
+                                        <p:attrNameLst>
+                                          <p:attrName>style.visibility</p:attrName>
+                                        </p:attrNameLst>
+                                      </p:cBhvr>
+                                      <p:to>
+                                        <p:strVal val="visible"/>
+                                      </p:to>
+                                    </p:set>
+                                    <p:anim calcmode="lin" valueType="num">
+                                      <p:cBhvr additive="base">
+                                        <p:cTn id="7" dur="500" fill="hold"/>
+                                        <p:tgtEl>
+                                          <p:spTgt spid="12"/>
+                                        </p:tgtEl>
+                                        <p:attrNameLst>
+                                          <p:attrName>ppt_x</p:attrName>
+                                        </p:attrNameLst>
+                                      </p:cBhvr>
+                                      <p:tavLst>
+                                        <p:tav tm="0">
+                                          <p:val>
+                                            <p:strVal val="1+#ppt_w/2"/>
+                                          </p:val>
+                                        </p:tav>
+                                        <p:tav tm="100000">
+                                          <p:val>
+                                            <p:strVal val="#ppt_x"/>
+                                          </p:val>
+                                        </p:tav>
+                                      </p:tavLst>
+                                    </p:anim>
+                                    <p:anim calcmode="lin" valueType="num">
+                                      <p:cBhvr additive="base">
+                                        <p:cTn id="8" dur="500" fill="hold"/>
+                                        <p:tgtEl>
+                                          <p:spTgt spid="12"/>
+                                        </p:tgtEl>
+                                        <p:attrNameLst>
+                                          <p:attrName>ppt_y</p:attrName>
+                                        </p:attrNameLst>
+                                      </p:cBhvr>
+                                      <p:tavLst>
+                                        <p:tav tm="0">
+                                          <p:val>
+                                            <p:strVal val="#ppt_y"/>
+                                          </p:val>
+                                        </p:tav>
+                                        <p:tav tm="100000">
+                                          <p:val>
+                                            <p:strVal val="#ppt_y"/>
+                                          </p:val>
+                                        </p:tav>
+                                      </p:tavLst>
+                                    </p:anim>
+                                  </p:childTnLst>
+                                </p:cTn>
+                              </p:par>
+                            </p:childTnLst>
+                          </p:cTn>
+                        </p:par>
+                      </p:childTnLst>
+                    </p:cTn>
+                  </p:par>
+                </p:childTnLst>
+              </p:cTn>
+              <p:prevCondLst>
+                <p:cond evt="onPrev" delay="0">
+                  <p:tgtEl>
+                    <p:sldTgt/>
+                  </p:tgtEl>
+                </p:cond>
+              </p:prevCondLst>
+              <p:nextCondLst>
+                <p:cond evt="onNext" delay="0">
+                  <p:tgtEl>
+                    <p:sldTgt/>
+                  </p:tgtEl>
+                </p:cond>
+              </p:nextCondLst>
+            </p:seq>
+          </p:childTnLst>
+        </p:cTn>
+      </p:par>
+    </p:tnLst>
+  </p:timing>
 </p:sld>
 </file>
 
@@ -6015,6 +6166,36 @@
           <a:xfrm>
             <a:off x="0" y="0"/>
             <a:ext cx="5299364" cy="6858000"/>
+          </a:xfrm>
+          <a:prstGeom prst="rect">
+            <a:avLst/>
+          </a:prstGeom>
+        </p:spPr>
+      </p:pic>
+      <p:pic>
+        <p:nvPicPr>
+          <p:cNvPr id="9" name="Picture 8">
+            <a:extLst>
+              <a:ext uri="{FF2B5EF4-FFF2-40B4-BE49-F238E27FC236}">
+                <a16:creationId xmlns:a16="http://schemas.microsoft.com/office/drawing/2014/main" id="{19751679-DEE0-5143-A793-F9DEC44AD542}"/>
+              </a:ext>
+            </a:extLst>
+          </p:cNvPr>
+          <p:cNvPicPr>
+            <a:picLocks noChangeAspect="1"/>
+          </p:cNvPicPr>
+          <p:nvPr/>
+        </p:nvPicPr>
+        <p:blipFill>
+          <a:blip r:embed="rId3"/>
+          <a:stretch>
+            <a:fillRect/>
+          </a:stretch>
+        </p:blipFill>
+        <p:spPr>
+          <a:xfrm>
+            <a:off x="8648700" y="4635500"/>
+            <a:ext cx="3543300" cy="2222500"/>
           </a:xfrm>
           <a:prstGeom prst="rect">
             <a:avLst/>
@@ -6081,6 +6262,66 @@
           </a:prstGeom>
         </p:spPr>
       </p:pic>
+      <p:pic>
+        <p:nvPicPr>
+          <p:cNvPr id="7" name="Picture 6">
+            <a:extLst>
+              <a:ext uri="{FF2B5EF4-FFF2-40B4-BE49-F238E27FC236}">
+                <a16:creationId xmlns:a16="http://schemas.microsoft.com/office/drawing/2014/main" id="{CEBEC4D4-F5BF-334A-985D-28A0C6F85080}"/>
+              </a:ext>
+            </a:extLst>
+          </p:cNvPr>
+          <p:cNvPicPr>
+            <a:picLocks noChangeAspect="1"/>
+          </p:cNvPicPr>
+          <p:nvPr/>
+        </p:nvPicPr>
+        <p:blipFill>
+          <a:blip r:embed="rId3"/>
+          <a:stretch>
+            <a:fillRect/>
+          </a:stretch>
+        </p:blipFill>
+        <p:spPr>
+          <a:xfrm>
+            <a:off x="9334500" y="5557108"/>
+            <a:ext cx="2857500" cy="1270000"/>
+          </a:xfrm>
+          <a:prstGeom prst="rect">
+            <a:avLst/>
+          </a:prstGeom>
+        </p:spPr>
+      </p:pic>
+      <p:pic>
+        <p:nvPicPr>
+          <p:cNvPr id="9" name="Picture 8">
+            <a:extLst>
+              <a:ext uri="{FF2B5EF4-FFF2-40B4-BE49-F238E27FC236}">
+                <a16:creationId xmlns:a16="http://schemas.microsoft.com/office/drawing/2014/main" id="{90C2B035-A7AF-1548-81B7-DC44F44E805A}"/>
+              </a:ext>
+            </a:extLst>
+          </p:cNvPr>
+          <p:cNvPicPr>
+            <a:picLocks noChangeAspect="1"/>
+          </p:cNvPicPr>
+          <p:nvPr/>
+        </p:nvPicPr>
+        <p:blipFill>
+          <a:blip r:embed="rId4"/>
+          <a:stretch>
+            <a:fillRect/>
+          </a:stretch>
+        </p:blipFill>
+        <p:spPr>
+          <a:xfrm>
+            <a:off x="6159500" y="3398108"/>
+            <a:ext cx="3175000" cy="2159000"/>
+          </a:xfrm>
+          <a:prstGeom prst="rect">
+            <a:avLst/>
+          </a:prstGeom>
+        </p:spPr>
+      </p:pic>
     </p:spTree>
     <p:extLst>
       <p:ext uri="{BB962C8B-B14F-4D97-AF65-F5344CB8AC3E}">
@@ -6282,8 +6523,8 @@
         </p:blipFill>
         <p:spPr>
           <a:xfrm>
-            <a:off x="-294485" y="-968353"/>
-            <a:ext cx="7009647" cy="8854339"/>
+            <a:off x="-383059" y="-963830"/>
+            <a:ext cx="7191632" cy="8862172"/>
           </a:xfrm>
           <a:prstGeom prst="rect">
             <a:avLst/>
@@ -6305,7 +6546,7 @@
         <p:spPr>
           <a:xfrm>
             <a:off x="6261652" y="417443"/>
-            <a:ext cx="5595731" cy="369332"/>
+            <a:ext cx="5595731" cy="1692771"/>
           </a:xfrm>
           <a:prstGeom prst="rect">
             <a:avLst/>
@@ -6318,9 +6559,195 @@
           </a:bodyPr>
           <a:lstStyle/>
           <a:p>
-            <a:r>
-              <a:rPr lang="en-US" dirty="0"/>
-              <a:t>Text about domain model</a:t>
+            <a:pPr marL="285750" indent="-285750">
+              <a:buFont typeface="Arial" panose="020B0604020202020204" pitchFamily="34" charset="0"/>
+              <a:buChar char="•"/>
+            </a:pPr>
+            <a:r>
+              <a:rPr lang="en-US" dirty="0">
+                <a:latin typeface="VCR OSD Mono" panose="02000609000000000000" pitchFamily="49" charset="0"/>
+              </a:rPr>
+              <a:t>User is extended by</a:t>
+            </a:r>
+          </a:p>
+          <a:p>
+            <a:pPr marL="742950" lvl="1" indent="-285750">
+              <a:buFont typeface="Arial" panose="020B0604020202020204" pitchFamily="34" charset="0"/>
+              <a:buChar char="•"/>
+            </a:pPr>
+            <a:r>
+              <a:rPr lang="en-US" dirty="0">
+                <a:latin typeface="VCR OSD Mono" panose="02000609000000000000" pitchFamily="49" charset="0"/>
+              </a:rPr>
+              <a:t>Subcontractor</a:t>
+            </a:r>
+          </a:p>
+          <a:p>
+            <a:pPr marL="742950" lvl="1" indent="-285750">
+              <a:buFont typeface="Arial" panose="020B0604020202020204" pitchFamily="34" charset="0"/>
+              <a:buChar char="•"/>
+            </a:pPr>
+            <a:r>
+              <a:rPr lang="en-US" dirty="0">
+                <a:latin typeface="VCR OSD Mono" panose="02000609000000000000" pitchFamily="49" charset="0"/>
+              </a:rPr>
+              <a:t>Representative</a:t>
+            </a:r>
+          </a:p>
+          <a:p>
+            <a:pPr marL="742950" lvl="1" indent="-285750">
+              <a:buFont typeface="Arial" panose="020B0604020202020204" pitchFamily="34" charset="0"/>
+              <a:buChar char="•"/>
+            </a:pPr>
+            <a:r>
+              <a:rPr lang="en-US" dirty="0">
+                <a:latin typeface="VCR OSD Mono" panose="02000609000000000000" pitchFamily="49" charset="0"/>
+              </a:rPr>
+              <a:t>Admin</a:t>
+            </a:r>
+          </a:p>
+          <a:p>
+            <a:pPr marL="1200150" lvl="2" indent="-285750">
+              <a:buFont typeface="Arial" panose="020B0604020202020204" pitchFamily="34" charset="0"/>
+              <a:buChar char="•"/>
+            </a:pPr>
+            <a:r>
+              <a:rPr lang="en-US" sz="1400" dirty="0">
+                <a:latin typeface="VCR OSD Mono" panose="02000609000000000000" pitchFamily="49" charset="0"/>
+              </a:rPr>
+              <a:t>One admin services zero or many receipts</a:t>
+            </a:r>
+          </a:p>
+          <a:p>
+            <a:pPr marL="742950" lvl="1" indent="-285750">
+              <a:buFont typeface="Arial" panose="020B0604020202020204" pitchFamily="34" charset="0"/>
+              <a:buChar char="•"/>
+            </a:pPr>
+            <a:r>
+              <a:rPr lang="en-US" dirty="0">
+                <a:latin typeface="VCR OSD Mono" panose="02000609000000000000" pitchFamily="49" charset="0"/>
+              </a:rPr>
+              <a:t>Customer</a:t>
+            </a:r>
+          </a:p>
+        </p:txBody>
+      </p:sp>
+      <p:pic>
+        <p:nvPicPr>
+          <p:cNvPr id="18" name="Picture 17">
+            <a:extLst>
+              <a:ext uri="{FF2B5EF4-FFF2-40B4-BE49-F238E27FC236}">
+                <a16:creationId xmlns:a16="http://schemas.microsoft.com/office/drawing/2014/main" id="{BB376DCD-1A08-C949-9BB5-F09292266DC4}"/>
+              </a:ext>
+            </a:extLst>
+          </p:cNvPr>
+          <p:cNvPicPr>
+            <a:picLocks noChangeAspect="1"/>
+          </p:cNvPicPr>
+          <p:nvPr/>
+        </p:nvPicPr>
+        <p:blipFill>
+          <a:blip r:embed="rId3"/>
+          <a:stretch>
+            <a:fillRect/>
+          </a:stretch>
+        </p:blipFill>
+        <p:spPr>
+          <a:xfrm>
+            <a:off x="9398000" y="4445000"/>
+            <a:ext cx="2794000" cy="2413000"/>
+          </a:xfrm>
+          <a:prstGeom prst="rect">
+            <a:avLst/>
+          </a:prstGeom>
+        </p:spPr>
+      </p:pic>
+      <p:sp>
+        <p:nvSpPr>
+          <p:cNvPr id="20" name="TextBox 19">
+            <a:extLst>
+              <a:ext uri="{FF2B5EF4-FFF2-40B4-BE49-F238E27FC236}">
+                <a16:creationId xmlns:a16="http://schemas.microsoft.com/office/drawing/2014/main" id="{4F220E92-0BE9-484D-A715-B48026A30B87}"/>
+              </a:ext>
+            </a:extLst>
+          </p:cNvPr>
+          <p:cNvSpPr txBox="1"/>
+          <p:nvPr/>
+        </p:nvSpPr>
+        <p:spPr>
+          <a:xfrm>
+            <a:off x="6261652" y="2126003"/>
+            <a:ext cx="5618920" cy="369332"/>
+          </a:xfrm>
+          <a:prstGeom prst="rect">
+            <a:avLst/>
+          </a:prstGeom>
+          <a:noFill/>
+        </p:spPr>
+        <p:txBody>
+          <a:bodyPr wrap="square" rtlCol="0">
+            <a:spAutoFit/>
+          </a:bodyPr>
+          <a:lstStyle/>
+          <a:p>
+            <a:r>
+              <a:rPr lang="en-US" dirty="0">
+                <a:latin typeface="VCR OSD Mono" panose="02000609000000000000" pitchFamily="49" charset="0"/>
+              </a:rPr>
+              <a:t>A rep and an Admin have a Payroll</a:t>
+            </a:r>
+          </a:p>
+        </p:txBody>
+      </p:sp>
+      <p:sp>
+        <p:nvSpPr>
+          <p:cNvPr id="21" name="TextBox 20">
+            <a:extLst>
+              <a:ext uri="{FF2B5EF4-FFF2-40B4-BE49-F238E27FC236}">
+                <a16:creationId xmlns:a16="http://schemas.microsoft.com/office/drawing/2014/main" id="{A8AE01EE-CFF9-0945-8821-74B2CB294976}"/>
+              </a:ext>
+            </a:extLst>
+          </p:cNvPr>
+          <p:cNvSpPr txBox="1"/>
+          <p:nvPr/>
+        </p:nvSpPr>
+        <p:spPr>
+          <a:xfrm>
+            <a:off x="6261652" y="2413000"/>
+            <a:ext cx="6104238" cy="923330"/>
+          </a:xfrm>
+          <a:prstGeom prst="rect">
+            <a:avLst/>
+          </a:prstGeom>
+          <a:noFill/>
+        </p:spPr>
+        <p:txBody>
+          <a:bodyPr wrap="square" rtlCol="0">
+            <a:spAutoFit/>
+          </a:bodyPr>
+          <a:lstStyle/>
+          <a:p>
+            <a:r>
+              <a:rPr lang="en-US" dirty="0">
+                <a:latin typeface="VCR OSD Mono" panose="02000609000000000000" pitchFamily="49" charset="0"/>
+              </a:rPr>
+              <a:t>A catalog contains cars</a:t>
+            </a:r>
+          </a:p>
+          <a:p>
+            <a:r>
+              <a:rPr lang="en-US" dirty="0">
+                <a:latin typeface="VCR OSD Mono" panose="02000609000000000000" pitchFamily="49" charset="0"/>
+              </a:rPr>
+              <a:t>An admin updates and services the catalog</a:t>
+            </a:r>
+          </a:p>
+          <a:p>
+            <a:r>
+              <a:rPr lang="en-US" dirty="0">
+                <a:latin typeface="VCR OSD Mono" panose="02000609000000000000" pitchFamily="49" charset="0"/>
+              </a:rPr>
+              <a:t>A company rep will update the cars info</a:t>
             </a:r>
           </a:p>
         </p:txBody>
@@ -6385,6 +6812,43 @@
           </a:prstGeom>
         </p:spPr>
       </p:pic>
+      <p:sp>
+        <p:nvSpPr>
+          <p:cNvPr id="13" name="TextBox 12">
+            <a:extLst>
+              <a:ext uri="{FF2B5EF4-FFF2-40B4-BE49-F238E27FC236}">
+                <a16:creationId xmlns:a16="http://schemas.microsoft.com/office/drawing/2014/main" id="{B7CEF4D3-E045-B14F-A96D-A696DD028A4D}"/>
+              </a:ext>
+            </a:extLst>
+          </p:cNvPr>
+          <p:cNvSpPr txBox="1"/>
+          <p:nvPr/>
+        </p:nvSpPr>
+        <p:spPr>
+          <a:xfrm>
+            <a:off x="5575852" y="1490008"/>
+            <a:ext cx="6616148" cy="1569660"/>
+          </a:xfrm>
+          <a:prstGeom prst="rect">
+            <a:avLst/>
+          </a:prstGeom>
+          <a:noFill/>
+        </p:spPr>
+        <p:txBody>
+          <a:bodyPr wrap="square" rtlCol="0">
+            <a:spAutoFit/>
+          </a:bodyPr>
+          <a:lstStyle/>
+          <a:p>
+            <a:r>
+              <a:rPr lang="en-US" sz="2400" dirty="0">
+                <a:latin typeface="VCR OSD Mono" panose="02000609000000000000" pitchFamily="49" charset="0"/>
+              </a:rPr>
+              <a:t>This list it not exhaustive. As with everything this list will grow and evolve as the software itself evolves.</a:t>
+            </a:r>
+          </a:p>
+        </p:txBody>
+      </p:sp>
     </p:spTree>
     <p:extLst>
       <p:ext uri="{BB962C8B-B14F-4D97-AF65-F5344CB8AC3E}">

</xml_diff>

<commit_message>
Added sample wireframe to the ppt
</commit_message>
<xml_diff>
--- a/Iteration-1/Iteration Presentation.pptx
+++ b/Iteration-1/Iteration Presentation.pptx
@@ -112,6 +112,11 @@
       </a:defRPr>
     </a:lvl9pPr>
   </p:defaultTextStyle>
+  <p:extLst>
+    <p:ext uri="{EFAFB233-063F-42B5-8137-9DF3F51BA10A}">
+      <p15:sldGuideLst xmlns:p15="http://schemas.microsoft.com/office/powerpoint/2012/main"/>
+    </p:ext>
+  </p:extLst>
 </p:presentation>
 </file>
 
@@ -345,7 +350,7 @@
             <a:fld id="{B61BEF0D-F0BB-DE4B-95CE-6DB70DBA9567}" type="datetimeFigureOut">
               <a:rPr lang="en-US" dirty="0"/>
               <a:pPr/>
-              <a:t>2/11/19</a:t>
+              <a:t>2/12/19</a:t>
             </a:fld>
             <a:endParaRPr lang="en-US" dirty="0"/>
           </a:p>
@@ -676,7 +681,7 @@
             <a:fld id="{B61BEF0D-F0BB-DE4B-95CE-6DB70DBA9567}" type="datetimeFigureOut">
               <a:rPr lang="en-US" dirty="0"/>
               <a:pPr/>
-              <a:t>2/11/19</a:t>
+              <a:t>2/12/19</a:t>
             </a:fld>
             <a:endParaRPr lang="en-US" dirty="0"/>
           </a:p>
@@ -951,7 +956,7 @@
             <a:fld id="{B61BEF0D-F0BB-DE4B-95CE-6DB70DBA9567}" type="datetimeFigureOut">
               <a:rPr lang="en-US" dirty="0"/>
               <a:pPr/>
-              <a:t>2/11/19</a:t>
+              <a:t>2/12/19</a:t>
             </a:fld>
             <a:endParaRPr lang="en-US" dirty="0"/>
           </a:p>
@@ -1516,7 +1521,7 @@
             <a:fld id="{B61BEF0D-F0BB-DE4B-95CE-6DB70DBA9567}" type="datetimeFigureOut">
               <a:rPr lang="en-US" dirty="0"/>
               <a:pPr/>
-              <a:t>2/11/19</a:t>
+              <a:t>2/12/19</a:t>
             </a:fld>
             <a:endParaRPr lang="en-US" dirty="0"/>
           </a:p>
@@ -1791,7 +1796,7 @@
             <a:fld id="{B61BEF0D-F0BB-DE4B-95CE-6DB70DBA9567}" type="datetimeFigureOut">
               <a:rPr lang="en-US" dirty="0"/>
               <a:pPr/>
-              <a:t>2/11/19</a:t>
+              <a:t>2/12/19</a:t>
             </a:fld>
             <a:endParaRPr lang="en-US" dirty="0"/>
           </a:p>
@@ -2350,7 +2355,7 @@
             <a:fld id="{B61BEF0D-F0BB-DE4B-95CE-6DB70DBA9567}" type="datetimeFigureOut">
               <a:rPr lang="en-US" dirty="0"/>
               <a:pPr/>
-              <a:t>2/11/19</a:t>
+              <a:t>2/12/19</a:t>
             </a:fld>
             <a:endParaRPr lang="en-US" dirty="0"/>
           </a:p>
@@ -2674,7 +2679,7 @@
             <a:fld id="{B61BEF0D-F0BB-DE4B-95CE-6DB70DBA9567}" type="datetimeFigureOut">
               <a:rPr lang="en-US" dirty="0"/>
               <a:pPr/>
-              <a:t>2/11/19</a:t>
+              <a:t>2/12/19</a:t>
             </a:fld>
             <a:endParaRPr lang="en-US" dirty="0"/>
           </a:p>
@@ -2848,7 +2853,7 @@
             <a:fld id="{B61BEF0D-F0BB-DE4B-95CE-6DB70DBA9567}" type="datetimeFigureOut">
               <a:rPr lang="en-US" dirty="0"/>
               <a:pPr/>
-              <a:t>2/11/19</a:t>
+              <a:t>2/12/19</a:t>
             </a:fld>
             <a:endParaRPr lang="en-US" dirty="0"/>
           </a:p>
@@ -3083,7 +3088,7 @@
             <a:fld id="{B61BEF0D-F0BB-DE4B-95CE-6DB70DBA9567}" type="datetimeFigureOut">
               <a:rPr lang="en-US" dirty="0"/>
               <a:pPr/>
-              <a:t>2/11/19</a:t>
+              <a:t>2/12/19</a:t>
             </a:fld>
             <a:endParaRPr lang="en-US" dirty="0"/>
           </a:p>
@@ -3280,7 +3285,7 @@
             <a:fld id="{B61BEF0D-F0BB-DE4B-95CE-6DB70DBA9567}" type="datetimeFigureOut">
               <a:rPr lang="en-US" dirty="0"/>
               <a:pPr/>
-              <a:t>2/11/19</a:t>
+              <a:t>2/12/19</a:t>
             </a:fld>
             <a:endParaRPr lang="en-US" dirty="0"/>
           </a:p>
@@ -3553,7 +3558,7 @@
             <a:fld id="{B61BEF0D-F0BB-DE4B-95CE-6DB70DBA9567}" type="datetimeFigureOut">
               <a:rPr lang="en-US" dirty="0"/>
               <a:pPr/>
-              <a:t>2/11/19</a:t>
+              <a:t>2/12/19</a:t>
             </a:fld>
             <a:endParaRPr lang="en-US" dirty="0"/>
           </a:p>
@@ -3816,7 +3821,7 @@
             <a:fld id="{B61BEF0D-F0BB-DE4B-95CE-6DB70DBA9567}" type="datetimeFigureOut">
               <a:rPr lang="en-US" dirty="0"/>
               <a:pPr/>
-              <a:t>2/11/19</a:t>
+              <a:t>2/12/19</a:t>
             </a:fld>
             <a:endParaRPr lang="en-US" dirty="0"/>
           </a:p>
@@ -4187,7 +4192,7 @@
             <a:fld id="{B61BEF0D-F0BB-DE4B-95CE-6DB70DBA9567}" type="datetimeFigureOut">
               <a:rPr lang="en-US" dirty="0"/>
               <a:pPr/>
-              <a:t>2/11/19</a:t>
+              <a:t>2/12/19</a:t>
             </a:fld>
             <a:endParaRPr lang="en-US" dirty="0"/>
           </a:p>
@@ -4332,7 +4337,7 @@
             <a:fld id="{B61BEF0D-F0BB-DE4B-95CE-6DB70DBA9567}" type="datetimeFigureOut">
               <a:rPr lang="en-US" dirty="0"/>
               <a:pPr/>
-              <a:t>2/11/19</a:t>
+              <a:t>2/12/19</a:t>
             </a:fld>
             <a:endParaRPr lang="en-US" dirty="0"/>
           </a:p>
@@ -4454,7 +4459,7 @@
             <a:fld id="{B61BEF0D-F0BB-DE4B-95CE-6DB70DBA9567}" type="datetimeFigureOut">
               <a:rPr lang="en-US" dirty="0"/>
               <a:pPr/>
-              <a:t>2/11/19</a:t>
+              <a:t>2/12/19</a:t>
             </a:fld>
             <a:endParaRPr lang="en-US" dirty="0"/>
           </a:p>
@@ -4736,7 +4741,7 @@
             <a:fld id="{B61BEF0D-F0BB-DE4B-95CE-6DB70DBA9567}" type="datetimeFigureOut">
               <a:rPr lang="en-US" dirty="0"/>
               <a:pPr/>
-              <a:t>2/11/19</a:t>
+              <a:t>2/12/19</a:t>
             </a:fld>
             <a:endParaRPr lang="en-US" dirty="0"/>
           </a:p>
@@ -5057,7 +5062,7 @@
             <a:fld id="{B61BEF0D-F0BB-DE4B-95CE-6DB70DBA9567}" type="datetimeFigureOut">
               <a:rPr lang="en-US" dirty="0"/>
               <a:pPr/>
-              <a:t>2/11/19</a:t>
+              <a:t>2/12/19</a:t>
             </a:fld>
             <a:endParaRPr lang="en-US" dirty="0"/>
           </a:p>
@@ -5268,7 +5273,7 @@
             <a:fld id="{B61BEF0D-F0BB-DE4B-95CE-6DB70DBA9567}" type="datetimeFigureOut">
               <a:rPr lang="en-US" dirty="0"/>
               <a:pPr/>
-              <a:t>2/11/19</a:t>
+              <a:t>2/12/19</a:t>
             </a:fld>
             <a:endParaRPr lang="en-US" dirty="0"/>
           </a:p>
@@ -6840,11 +6845,12 @@
           </a:bodyPr>
           <a:lstStyle/>
           <a:p>
+            <a:pPr algn="ctr"/>
             <a:r>
               <a:rPr lang="en-US" sz="2400" dirty="0">
                 <a:latin typeface="VCR OSD Mono" panose="02000609000000000000" pitchFamily="49" charset="0"/>
               </a:rPr>
-              <a:t>This list it not exhaustive. As with everything this list will grow and evolve as the software itself evolves.</a:t>
+              <a:t>This list is not exhaustive. As with everything this list will grow and evolve as the software itself evolves.</a:t>
             </a:r>
           </a:p>
         </p:txBody>
@@ -7136,59 +7142,36 @@
           <a:chExt cx="0" cy="0"/>
         </a:xfrm>
       </p:grpSpPr>
-      <p:sp>
-        <p:nvSpPr>
-          <p:cNvPr id="2" name="Title 1">
+      <p:pic>
+        <p:nvPicPr>
+          <p:cNvPr id="7" name="Picture 6">
             <a:extLst>
               <a:ext uri="{FF2B5EF4-FFF2-40B4-BE49-F238E27FC236}">
-                <a16:creationId xmlns:a16="http://schemas.microsoft.com/office/drawing/2014/main" id="{24518681-A24E-304D-9BBD-81747786C1EB}"/>
+                <a16:creationId xmlns:a16="http://schemas.microsoft.com/office/drawing/2014/main" id="{3BE3EE35-A0F4-174D-BE61-9B552A225BA6}"/>
               </a:ext>
             </a:extLst>
           </p:cNvPr>
-          <p:cNvSpPr>
-            <a:spLocks noGrp="1"/>
-          </p:cNvSpPr>
-          <p:nvPr>
-            <p:ph type="title"/>
-          </p:nvPr>
-        </p:nvSpPr>
-        <p:spPr/>
-        <p:txBody>
-          <a:bodyPr/>
-          <a:lstStyle/>
-          <a:p>
-            <a:r>
-              <a:rPr lang="en-US" dirty="0"/>
-              <a:t>wireframe</a:t>
-            </a:r>
-          </a:p>
-        </p:txBody>
-      </p:sp>
-      <p:sp>
-        <p:nvSpPr>
-          <p:cNvPr id="3" name="Content Placeholder 2">
-            <a:extLst>
-              <a:ext uri="{FF2B5EF4-FFF2-40B4-BE49-F238E27FC236}">
-                <a16:creationId xmlns:a16="http://schemas.microsoft.com/office/drawing/2014/main" id="{C9E5A4F0-79C7-8D40-8C84-98B2A8BC1BC3}"/>
-              </a:ext>
-            </a:extLst>
-          </p:cNvPr>
-          <p:cNvSpPr>
-            <a:spLocks noGrp="1"/>
-          </p:cNvSpPr>
-          <p:nvPr>
-            <p:ph idx="1"/>
-          </p:nvPr>
-        </p:nvSpPr>
-        <p:spPr/>
-        <p:txBody>
-          <a:bodyPr/>
-          <a:lstStyle/>
-          <a:p>
-            <a:endParaRPr lang="en-US"/>
-          </a:p>
-        </p:txBody>
-      </p:sp>
+          <p:cNvPicPr>
+            <a:picLocks noChangeAspect="1"/>
+          </p:cNvPicPr>
+          <p:nvPr/>
+        </p:nvPicPr>
+        <p:blipFill>
+          <a:blip r:embed="rId2"/>
+          <a:stretch>
+            <a:fillRect/>
+          </a:stretch>
+        </p:blipFill>
+        <p:spPr>
+          <a:xfrm>
+            <a:off x="2282687" y="353406"/>
+            <a:ext cx="7626626" cy="5920670"/>
+          </a:xfrm>
+          <a:prstGeom prst="rect">
+            <a:avLst/>
+          </a:prstGeom>
+        </p:spPr>
+      </p:pic>
     </p:spTree>
     <p:extLst>
       <p:ext uri="{BB962C8B-B14F-4D97-AF65-F5344CB8AC3E}">

</xml_diff>

<commit_message>
Moved files around and updated naming scheme and such.
</commit_message>
<xml_diff>
--- a/Iteration-1/Iteration Presentation.pptx
+++ b/Iteration-1/Iteration Presentation.pptx
@@ -5889,19 +5889,7 @@
               <a:rPr lang="en-US" sz="1100" dirty="0">
                 <a:latin typeface="VCR OSD Mono" panose="02000609000000000000" pitchFamily="49" charset="0"/>
               </a:rPr>
-              <a:t>Matthew Darby, Maggie Burton, Weston Straw, Mark Du, </a:t>
-            </a:r>
-            <a:r>
-              <a:rPr lang="en-US" sz="1100" i="1" dirty="0">
-                <a:latin typeface="VCR OSD Mono" panose="02000609000000000000" pitchFamily="49" charset="0"/>
-              </a:rPr>
-              <a:t>Andrew Case</a:t>
-            </a:r>
-            <a:r>
-              <a:rPr lang="en-US" sz="1100" dirty="0">
-                <a:latin typeface="VCR OSD Mono" panose="02000609000000000000" pitchFamily="49" charset="0"/>
-              </a:rPr>
-              <a:t>, Stevie Damrel</a:t>
+              <a:t>Matthew Darby, Maggie Burton, Weston Straw, Mark Du, Andrew Case, Stevie Damrel</a:t>
             </a:r>
           </a:p>
         </p:txBody>

</xml_diff>